<commit_message>
Updated: .pptx and sketch
</commit_message>
<xml_diff>
--- a/docs/ChatterPlay.pptx
+++ b/docs/ChatterPlay.pptx
@@ -8059,8 +8059,8 @@
         </p:nvSpPr>
         <p:spPr>
           <a:xfrm>
-            <a:off x="8928975" y="3342497"/>
-            <a:ext cx="1318826" cy="360040"/>
+            <a:off x="9120336" y="3342497"/>
+            <a:ext cx="936104" cy="360040"/>
           </a:xfrm>
           <a:prstGeom prst="rect">
             <a:avLst/>
@@ -8113,8 +8113,8 @@
         </p:nvSpPr>
         <p:spPr>
           <a:xfrm>
-            <a:off x="8928976" y="3333205"/>
-            <a:ext cx="1318826" cy="369332"/>
+            <a:off x="9120336" y="3347143"/>
+            <a:ext cx="936104" cy="369332"/>
           </a:xfrm>
           <a:prstGeom prst="rect">
             <a:avLst/>
@@ -8142,11 +8142,11 @@
               </a:tabLst>
             </a:pPr>
             <a:r>
-              <a:rPr lang="de-DE" dirty="0">
+              <a:rPr lang="de-DE">
                 <a:latin typeface="+mn-lt"/>
                 <a:cs typeface="Arial" panose="020B0604020202020204" pitchFamily="34" charset="0"/>
               </a:rPr>
-              <a:t>Controller</a:t>
+              <a:t>Model</a:t>
             </a:r>
             <a:endParaRPr lang="en-US" kern="1200" dirty="0">
               <a:solidFill>
@@ -8309,8 +8309,8 @@
         </p:nvSpPr>
         <p:spPr>
           <a:xfrm>
-            <a:off x="1991544" y="3342497"/>
-            <a:ext cx="936104" cy="360040"/>
+            <a:off x="1726551" y="3342497"/>
+            <a:ext cx="1466090" cy="360040"/>
           </a:xfrm>
           <a:prstGeom prst="rect">
             <a:avLst/>
@@ -8363,8 +8363,8 @@
         </p:nvSpPr>
         <p:spPr>
           <a:xfrm>
-            <a:off x="1991544" y="3333205"/>
-            <a:ext cx="936104" cy="369332"/>
+            <a:off x="1751035" y="3333205"/>
+            <a:ext cx="1417121" cy="369332"/>
           </a:xfrm>
           <a:prstGeom prst="rect">
             <a:avLst/>
@@ -8392,11 +8392,11 @@
               </a:tabLst>
             </a:pPr>
             <a:r>
-              <a:rPr lang="de-DE" dirty="0">
+              <a:rPr lang="de-DE">
                 <a:latin typeface="+mn-lt"/>
                 <a:cs typeface="Arial" panose="020B0604020202020204" pitchFamily="34" charset="0"/>
               </a:rPr>
-              <a:t>Model</a:t>
+              <a:t>View Model</a:t>
             </a:r>
             <a:endParaRPr lang="en-US" kern="1200" dirty="0">
               <a:solidFill>
@@ -8431,11 +8431,11 @@
           </a:prstGeom>
           <a:ln w="38100" cap="flat" cmpd="sng" algn="ctr">
             <a:solidFill>
-              <a:schemeClr val="dk1"/>
+              <a:schemeClr val="tx1"/>
             </a:solidFill>
             <a:prstDash val="solid"/>
             <a:round/>
-            <a:headEnd type="none" w="med" len="med"/>
+            <a:headEnd type="arrow" w="med" len="med"/>
             <a:tailEnd type="arrow" w="med" len="med"/>
           </a:ln>
         </p:spPr>
@@ -8471,53 +8471,6 @@
         <p:spPr bwMode="auto">
           <a:xfrm flipH="1">
             <a:off x="2482636" y="2060848"/>
-            <a:ext cx="1752856" cy="1270566"/>
-          </a:xfrm>
-          <a:prstGeom prst="straightConnector1">
-            <a:avLst/>
-          </a:prstGeom>
-          <a:ln w="38100" cap="flat" cmpd="sng" algn="ctr">
-            <a:solidFill>
-              <a:schemeClr val="dk1"/>
-            </a:solidFill>
-            <a:prstDash val="solid"/>
-            <a:round/>
-            <a:headEnd type="none" w="med" len="med"/>
-            <a:tailEnd type="arrow" w="med" len="med"/>
-          </a:ln>
-        </p:spPr>
-        <p:style>
-          <a:lnRef idx="0">
-            <a:scrgbClr r="0" g="0" b="0"/>
-          </a:lnRef>
-          <a:fillRef idx="0">
-            <a:scrgbClr r="0" g="0" b="0"/>
-          </a:fillRef>
-          <a:effectRef idx="0">
-            <a:scrgbClr r="0" g="0" b="0"/>
-          </a:effectRef>
-          <a:fontRef idx="minor">
-            <a:schemeClr val="tx1"/>
-          </a:fontRef>
-        </p:style>
-      </p:cxnSp>
-      <p:cxnSp>
-        <p:nvCxnSpPr>
-          <p:cNvPr id="31" name="Gerade Verbindung mit Pfeil 30">
-            <a:extLst>
-              <a:ext uri="{FF2B5EF4-FFF2-40B4-BE49-F238E27FC236}">
-                <a16:creationId xmlns:a16="http://schemas.microsoft.com/office/drawing/2014/main" id="{418EA02F-2841-DE2A-050F-698672B4B090}"/>
-              </a:ext>
-            </a:extLst>
-          </p:cNvPr>
-          <p:cNvCxnSpPr>
-            <a:cxnSpLocks/>
-          </p:cNvCxnSpPr>
-          <p:nvPr/>
-        </p:nvCxnSpPr>
-        <p:spPr bwMode="auto">
-          <a:xfrm>
-            <a:off x="7752184" y="2057993"/>
             <a:ext cx="1752856" cy="1270566"/>
           </a:xfrm>
           <a:prstGeom prst="straightConnector1">
@@ -15247,23 +15200,6 @@
 </file>
 
 <file path=customXml/item1.xml><?xml version="1.0" encoding="utf-8"?>
-<p:properties xmlns:p="http://schemas.microsoft.com/office/2006/metadata/properties" xmlns:xsi="http://www.w3.org/2001/XMLSchema-instance" xmlns:pc="http://schemas.microsoft.com/office/infopath/2007/PartnerControls">
-  <documentManagement>
-    <_activity xmlns="c5f773cb-4f3f-49ef-8641-38218f43023e" xsi:nil="true"/>
-  </documentManagement>
-</p:properties>
-</file>
-
-<file path=customXml/item2.xml><?xml version="1.0" encoding="utf-8"?>
-<?mso-contentType ?>
-<FormTemplates xmlns="http://schemas.microsoft.com/sharepoint/v3/contenttype/forms">
-  <Display>DocumentLibraryForm</Display>
-  <Edit>DocumentLibraryForm</Edit>
-  <New>DocumentLibraryForm</New>
-</FormTemplates>
-</file>
-
-<file path=customXml/item3.xml><?xml version="1.0" encoding="utf-8"?>
 <ct:contentTypeSchema xmlns:ct="http://schemas.microsoft.com/office/2006/metadata/contentType" xmlns:ma="http://schemas.microsoft.com/office/2006/metadata/properties/metaAttributes" ct:_="" ma:_="" ma:contentTypeName="Dokument" ma:contentTypeID="0x010100ED304B4D7EA72E4FAD5657036FA1D518" ma:contentTypeVersion="6" ma:contentTypeDescription="Ein neues Dokument erstellen." ma:contentTypeScope="" ma:versionID="03ae338e2c1c17b12bd95ab21f24ec37">
   <xsd:schema xmlns:xsd="http://www.w3.org/2001/XMLSchema" xmlns:xs="http://www.w3.org/2001/XMLSchema" xmlns:p="http://schemas.microsoft.com/office/2006/metadata/properties" xmlns:ns3="c5f773cb-4f3f-49ef-8641-38218f43023e" targetNamespace="http://schemas.microsoft.com/office/2006/metadata/properties" ma:root="true" ma:fieldsID="4b8ad193d239bb942442f4a1c29edddc" ns3:_="">
     <xsd:import namespace="c5f773cb-4f3f-49ef-8641-38218f43023e"/>
@@ -15419,31 +15355,24 @@
 </ct:contentTypeSchema>
 </file>
 
-<file path=customXml/itemProps1.xml><?xml version="1.0" encoding="utf-8"?>
-<ds:datastoreItem xmlns:ds="http://schemas.openxmlformats.org/officeDocument/2006/customXml" ds:itemID="{4CF18742-E7F8-494A-8E75-FB20081A182A}">
-  <ds:schemaRefs>
-    <ds:schemaRef ds:uri="http://purl.org/dc/elements/1.1/"/>
-    <ds:schemaRef ds:uri="http://schemas.openxmlformats.org/package/2006/metadata/core-properties"/>
-    <ds:schemaRef ds:uri="http://schemas.microsoft.com/office/2006/documentManagement/types"/>
-    <ds:schemaRef ds:uri="c5f773cb-4f3f-49ef-8641-38218f43023e"/>
-    <ds:schemaRef ds:uri="http://www.w3.org/XML/1998/namespace"/>
-    <ds:schemaRef ds:uri="http://schemas.microsoft.com/office/2006/metadata/properties"/>
-    <ds:schemaRef ds:uri="http://purl.org/dc/terms/"/>
-    <ds:schemaRef ds:uri="http://schemas.microsoft.com/office/infopath/2007/PartnerControls"/>
-    <ds:schemaRef ds:uri="http://purl.org/dc/dcmitype/"/>
-  </ds:schemaRefs>
-</ds:datastoreItem>
+<file path=customXml/item2.xml><?xml version="1.0" encoding="utf-8"?>
+<?mso-contentType ?>
+<FormTemplates xmlns="http://schemas.microsoft.com/sharepoint/v3/contenttype/forms">
+  <Display>DocumentLibraryForm</Display>
+  <Edit>DocumentLibraryForm</Edit>
+  <New>DocumentLibraryForm</New>
+</FormTemplates>
 </file>
 
-<file path=customXml/itemProps2.xml><?xml version="1.0" encoding="utf-8"?>
-<ds:datastoreItem xmlns:ds="http://schemas.openxmlformats.org/officeDocument/2006/customXml" ds:itemID="{BA8DEA03-4467-41B6-B650-D93DF5BADB1B}">
-  <ds:schemaRefs>
-    <ds:schemaRef ds:uri="http://schemas.microsoft.com/sharepoint/v3/contenttype/forms"/>
-  </ds:schemaRefs>
-</ds:datastoreItem>
+<file path=customXml/item3.xml><?xml version="1.0" encoding="utf-8"?>
+<p:properties xmlns:p="http://schemas.microsoft.com/office/2006/metadata/properties" xmlns:xsi="http://www.w3.org/2001/XMLSchema-instance" xmlns:pc="http://schemas.microsoft.com/office/infopath/2007/PartnerControls">
+  <documentManagement>
+    <_activity xmlns="c5f773cb-4f3f-49ef-8641-38218f43023e" xsi:nil="true"/>
+  </documentManagement>
+</p:properties>
 </file>
 
-<file path=customXml/itemProps3.xml><?xml version="1.0" encoding="utf-8"?>
+<file path=customXml/itemProps1.xml><?xml version="1.0" encoding="utf-8"?>
 <ds:datastoreItem xmlns:ds="http://schemas.openxmlformats.org/officeDocument/2006/customXml" ds:itemID="{3232C61F-E29A-4E36-A0FF-73212CEC8D23}">
   <ds:schemaRefs>
     <ds:schemaRef ds:uri="http://schemas.microsoft.com/office/2006/metadata/contentType"/>
@@ -15459,4 +15388,28 @@
     <ds:schemaRef ds:uri="http://schemas.microsoft.com/internal/obd"/>
   </ds:schemaRefs>
 </ds:datastoreItem>
+</file>
+
+<file path=customXml/itemProps2.xml><?xml version="1.0" encoding="utf-8"?>
+<ds:datastoreItem xmlns:ds="http://schemas.openxmlformats.org/officeDocument/2006/customXml" ds:itemID="{BA8DEA03-4467-41B6-B650-D93DF5BADB1B}">
+  <ds:schemaRefs>
+    <ds:schemaRef ds:uri="http://schemas.microsoft.com/sharepoint/v3/contenttype/forms"/>
+  </ds:schemaRefs>
+</ds:datastoreItem>
+</file>
+
+<file path=customXml/itemProps3.xml><?xml version="1.0" encoding="utf-8"?>
+<ds:datastoreItem xmlns:ds="http://schemas.openxmlformats.org/officeDocument/2006/customXml" ds:itemID="{4CF18742-E7F8-494A-8E75-FB20081A182A}">
+  <ds:schemaRefs>
+    <ds:schemaRef ds:uri="http://purl.org/dc/elements/1.1/"/>
+    <ds:schemaRef ds:uri="http://schemas.openxmlformats.org/package/2006/metadata/core-properties"/>
+    <ds:schemaRef ds:uri="http://schemas.microsoft.com/office/2006/documentManagement/types"/>
+    <ds:schemaRef ds:uri="c5f773cb-4f3f-49ef-8641-38218f43023e"/>
+    <ds:schemaRef ds:uri="http://www.w3.org/XML/1998/namespace"/>
+    <ds:schemaRef ds:uri="http://schemas.microsoft.com/office/2006/metadata/properties"/>
+    <ds:schemaRef ds:uri="http://purl.org/dc/terms/"/>
+    <ds:schemaRef ds:uri="http://schemas.microsoft.com/office/infopath/2007/PartnerControls"/>
+    <ds:schemaRef ds:uri="http://purl.org/dc/dcmitype/"/>
+  </ds:schemaRefs>
+</ds:datastoreItem>
 </file>
</xml_diff>